<commit_message>
chore: Corregir presentación y subir de nuevo
</commit_message>
<xml_diff>
--- a/Fase 3/Evidencias grupales/Presentación Final del proyecto (Inglés).pptx
+++ b/Fase 3/Evidencias grupales/Presentación Final del proyecto (Inglés).pptx
@@ -6130,55 +6130,9 @@
           </a:p>
         </p:txBody>
       </p:sp>
-      <p:sp>
-        <p:nvSpPr>
-          <p:cNvPr name="Freeform 5" id="5"/>
-          <p:cNvSpPr/>
-          <p:nvPr/>
-        </p:nvSpPr>
-        <p:spPr>
-          <a:xfrm flipH="false" flipV="false" rot="0">
-            <a:off x="0" y="1865746"/>
-            <a:ext cx="18423986" cy="7956364"/>
-          </a:xfrm>
-          <a:custGeom>
-            <a:avLst/>
-            <a:gdLst/>
-            <a:ahLst/>
-            <a:cxnLst/>
-            <a:rect r="r" b="b" t="t" l="l"/>
-            <a:pathLst>
-              <a:path h="7956364" w="18423986">
-                <a:moveTo>
-                  <a:pt x="0" y="0"/>
-                </a:moveTo>
-                <a:lnTo>
-                  <a:pt x="18423986" y="0"/>
-                </a:lnTo>
-                <a:lnTo>
-                  <a:pt x="18423986" y="7956364"/>
-                </a:lnTo>
-                <a:lnTo>
-                  <a:pt x="0" y="7956364"/>
-                </a:lnTo>
-                <a:lnTo>
-                  <a:pt x="0" y="0"/>
-                </a:lnTo>
-                <a:close/>
-              </a:path>
-            </a:pathLst>
-          </a:custGeom>
-          <a:blipFill>
-            <a:blip r:embed="rId6"/>
-            <a:stretch>
-              <a:fillRect l="0" t="0" r="0" b="-1598"/>
-            </a:stretch>
-          </a:blipFill>
-        </p:spPr>
-      </p:sp>
       <p:grpSp>
         <p:nvGrpSpPr>
-          <p:cNvPr name="Group 6" id="6"/>
+          <p:cNvPr name="Group 5" id="5"/>
           <p:cNvGrpSpPr/>
           <p:nvPr/>
         </p:nvGrpSpPr>
@@ -6192,7 +6146,7 @@
         </p:grpSpPr>
         <p:sp>
           <p:nvSpPr>
-            <p:cNvPr name="Freeform 7" id="7"/>
+            <p:cNvPr name="Freeform 6" id="6"/>
             <p:cNvSpPr/>
             <p:nvPr/>
           </p:nvSpPr>
@@ -6259,7 +6213,7 @@
               </a:pathLst>
             </a:custGeom>
             <a:blipFill>
-              <a:blip r:embed="rId7"/>
+              <a:blip r:embed="rId6"/>
               <a:stretch>
                 <a:fillRect l="-17658" t="0" r="-17658" b="0"/>
               </a:stretch>
@@ -6267,6 +6221,52 @@
           </p:spPr>
         </p:sp>
       </p:grpSp>
+      <p:sp>
+        <p:nvSpPr>
+          <p:cNvPr name="Freeform 7" id="7"/>
+          <p:cNvSpPr/>
+          <p:nvPr/>
+        </p:nvSpPr>
+        <p:spPr>
+          <a:xfrm flipH="false" flipV="false" rot="0">
+            <a:off x="0" y="2066435"/>
+            <a:ext cx="18288000" cy="6858000"/>
+          </a:xfrm>
+          <a:custGeom>
+            <a:avLst/>
+            <a:gdLst/>
+            <a:ahLst/>
+            <a:cxnLst/>
+            <a:rect r="r" b="b" t="t" l="l"/>
+            <a:pathLst>
+              <a:path h="6858000" w="18288000">
+                <a:moveTo>
+                  <a:pt x="0" y="0"/>
+                </a:moveTo>
+                <a:lnTo>
+                  <a:pt x="18288000" y="0"/>
+                </a:lnTo>
+                <a:lnTo>
+                  <a:pt x="18288000" y="6858000"/>
+                </a:lnTo>
+                <a:lnTo>
+                  <a:pt x="0" y="6858000"/>
+                </a:lnTo>
+                <a:lnTo>
+                  <a:pt x="0" y="0"/>
+                </a:lnTo>
+                <a:close/>
+              </a:path>
+            </a:pathLst>
+          </a:custGeom>
+          <a:blipFill>
+            <a:blip r:embed="rId7"/>
+            <a:stretch>
+              <a:fillRect l="0" t="0" r="0" b="0"/>
+            </a:stretch>
+          </a:blipFill>
+        </p:spPr>
+      </p:sp>
     </p:spTree>
   </p:cSld>
   <p:clrMapOvr>

</xml_diff>

<commit_message>
chore: Subir presentación corregida en inglés
</commit_message>
<xml_diff>
--- a/Fase 3/Evidencias grupales/Presentación Final del proyecto (Inglés).pptx
+++ b/Fase 3/Evidencias grupales/Presentación Final del proyecto (Inglés).pptx
@@ -351,7 +351,7 @@
             <a:fld id="{1D8BD707-D9CF-40AE-B4C6-C98DA3205C09}" type="datetimeFigureOut">
               <a:rPr lang="en-US" smtClean="0"/>
               <a:pPr/>
-              <a:t>11/19/2025</a:t>
+              <a:t>11/20/2025</a:t>
             </a:fld>
             <a:endParaRPr lang="en-US"/>
           </a:p>
@@ -516,7 +516,7 @@
             <a:fld id="{1D8BD707-D9CF-40AE-B4C6-C98DA3205C09}" type="datetimeFigureOut">
               <a:rPr lang="en-US" smtClean="0"/>
               <a:pPr/>
-              <a:t>11/19/2025</a:t>
+              <a:t>11/20/2025</a:t>
             </a:fld>
             <a:endParaRPr lang="en-US"/>
           </a:p>
@@ -691,7 +691,7 @@
             <a:fld id="{1D8BD707-D9CF-40AE-B4C6-C98DA3205C09}" type="datetimeFigureOut">
               <a:rPr lang="en-US" smtClean="0"/>
               <a:pPr/>
-              <a:t>11/19/2025</a:t>
+              <a:t>11/20/2025</a:t>
             </a:fld>
             <a:endParaRPr lang="en-US"/>
           </a:p>
@@ -856,7 +856,7 @@
             <a:fld id="{1D8BD707-D9CF-40AE-B4C6-C98DA3205C09}" type="datetimeFigureOut">
               <a:rPr lang="en-US" smtClean="0"/>
               <a:pPr/>
-              <a:t>11/19/2025</a:t>
+              <a:t>11/20/2025</a:t>
             </a:fld>
             <a:endParaRPr lang="en-US"/>
           </a:p>
@@ -1098,7 +1098,7 @@
             <a:fld id="{1D8BD707-D9CF-40AE-B4C6-C98DA3205C09}" type="datetimeFigureOut">
               <a:rPr lang="en-US" smtClean="0"/>
               <a:pPr/>
-              <a:t>11/19/2025</a:t>
+              <a:t>11/20/2025</a:t>
             </a:fld>
             <a:endParaRPr lang="en-US"/>
           </a:p>
@@ -1380,7 +1380,7 @@
             <a:fld id="{1D8BD707-D9CF-40AE-B4C6-C98DA3205C09}" type="datetimeFigureOut">
               <a:rPr lang="en-US" smtClean="0"/>
               <a:pPr/>
-              <a:t>11/19/2025</a:t>
+              <a:t>11/20/2025</a:t>
             </a:fld>
             <a:endParaRPr lang="en-US"/>
           </a:p>
@@ -1796,7 +1796,7 @@
             <a:fld id="{1D8BD707-D9CF-40AE-B4C6-C98DA3205C09}" type="datetimeFigureOut">
               <a:rPr lang="en-US" smtClean="0"/>
               <a:pPr/>
-              <a:t>11/19/2025</a:t>
+              <a:t>11/20/2025</a:t>
             </a:fld>
             <a:endParaRPr lang="en-US"/>
           </a:p>
@@ -1910,7 +1910,7 @@
             <a:fld id="{1D8BD707-D9CF-40AE-B4C6-C98DA3205C09}" type="datetimeFigureOut">
               <a:rPr lang="en-US" smtClean="0"/>
               <a:pPr/>
-              <a:t>11/19/2025</a:t>
+              <a:t>11/20/2025</a:t>
             </a:fld>
             <a:endParaRPr lang="en-US"/>
           </a:p>
@@ -2002,7 +2002,7 @@
             <a:fld id="{1D8BD707-D9CF-40AE-B4C6-C98DA3205C09}" type="datetimeFigureOut">
               <a:rPr lang="en-US" smtClean="0"/>
               <a:pPr/>
-              <a:t>11/19/2025</a:t>
+              <a:t>11/20/2025</a:t>
             </a:fld>
             <a:endParaRPr lang="en-US"/>
           </a:p>
@@ -2274,7 +2274,7 @@
             <a:fld id="{1D8BD707-D9CF-40AE-B4C6-C98DA3205C09}" type="datetimeFigureOut">
               <a:rPr lang="en-US" smtClean="0"/>
               <a:pPr/>
-              <a:t>11/19/2025</a:t>
+              <a:t>11/20/2025</a:t>
             </a:fld>
             <a:endParaRPr lang="en-US"/>
           </a:p>
@@ -2523,7 +2523,7 @@
             <a:fld id="{1D8BD707-D9CF-40AE-B4C6-C98DA3205C09}" type="datetimeFigureOut">
               <a:rPr lang="en-US" smtClean="0"/>
               <a:pPr/>
-              <a:t>11/19/2025</a:t>
+              <a:t>11/20/2025</a:t>
             </a:fld>
             <a:endParaRPr lang="en-US"/>
           </a:p>
@@ -2731,7 +2731,7 @@
             <a:fld id="{1D8BD707-D9CF-40AE-B4C6-C98DA3205C09}" type="datetimeFigureOut">
               <a:rPr lang="en-US" smtClean="0"/>
               <a:pPr/>
-              <a:t>11/19/2025</a:t>
+              <a:t>11/20/2025</a:t>
             </a:fld>
             <a:endParaRPr lang="en-US"/>
           </a:p>
@@ -9093,7 +9093,7 @@
         <p:spPr>
           <a:xfrm>
             <a:off x="11363666" y="3111055"/>
-            <a:ext cx="3426127" cy="2427107"/>
+            <a:ext cx="3426127" cy="2128916"/>
           </a:xfrm>
           <a:prstGeom prst="rect">
             <a:avLst/>
@@ -9120,16 +9120,9 @@
                 <a:cs typeface="Public Sans"/>
                 <a:sym typeface="Public Sans"/>
               </a:rPr>
-              <a:t>PROJECT MANAGER</a:t>
-            </a:r>
-          </a:p>
-          <a:p>
-            <a:pPr algn="just">
-              <a:lnSpc>
-                <a:spcPts val="2442"/>
-              </a:lnSpc>
-            </a:pPr>
-            <a:endParaRPr lang="en-US" sz="1744">
+              <a:t>PROJECT OWNER</a:t>
+            </a:r>
+            <a:endParaRPr lang="en-US" sz="1744" dirty="0">
               <a:solidFill>
                 <a:srgbClr val="FFFFFF"/>
               </a:solidFill>
@@ -9145,7 +9138,7 @@
                 <a:spcPts val="2442"/>
               </a:lnSpc>
             </a:pPr>
-            <a:endParaRPr lang="en-US" sz="1744">
+            <a:endParaRPr lang="en-US" sz="1744" dirty="0">
               <a:solidFill>
                 <a:srgbClr val="FFFFFF"/>
               </a:solidFill>
@@ -9161,7 +9154,7 @@
                 <a:spcPts val="2442"/>
               </a:lnSpc>
             </a:pPr>
-            <a:endParaRPr lang="en-US" sz="1744">
+            <a:endParaRPr lang="en-US" sz="1744" dirty="0">
               <a:solidFill>
                 <a:srgbClr val="FFFFFF"/>
               </a:solidFill>
@@ -9177,7 +9170,7 @@
                 <a:spcPts val="2442"/>
               </a:lnSpc>
             </a:pPr>
-            <a:endParaRPr lang="en-US" sz="1744">
+            <a:endParaRPr lang="en-US" sz="1744" dirty="0">
               <a:solidFill>
                 <a:srgbClr val="FFFFFF"/>
               </a:solidFill>
@@ -9193,7 +9186,7 @@
                 <a:spcPts val="2442"/>
               </a:lnSpc>
             </a:pPr>
-            <a:endParaRPr lang="en-US" sz="1744">
+            <a:endParaRPr lang="en-US" sz="1744" dirty="0">
               <a:solidFill>
                 <a:srgbClr val="FFFFFF"/>
               </a:solidFill>
@@ -9209,7 +9202,7 @@
                 <a:spcPts val="2442"/>
               </a:lnSpc>
             </a:pPr>
-            <a:endParaRPr lang="en-US" sz="1744">
+            <a:endParaRPr lang="en-US" sz="1744" dirty="0">
               <a:solidFill>
                 <a:srgbClr val="FFFFFF"/>
               </a:solidFill>
@@ -9225,7 +9218,7 @@
                 <a:spcPts val="2442"/>
               </a:lnSpc>
             </a:pPr>
-            <a:endParaRPr lang="en-US" sz="1744">
+            <a:endParaRPr lang="en-US" sz="1744" dirty="0">
               <a:solidFill>
                 <a:srgbClr val="FFFFFF"/>
               </a:solidFill>

</xml_diff>